<commit_message>
add debug section and video
</commit_message>
<xml_diff>
--- a/Courses/Computer-Modeling-and-IT/Computer-Modeling-and-IT-6-Class/27-{last-number}-Python/28-Linear-And-Branching-Algorithm-Implementation/28-Linear-And-Branching-Algorithm-Implementation.pptx
+++ b/Courses/Computer-Modeling-and-IT/Computer-Modeling-and-IT-6-Class/27-{last-number}-Python/28-Linear-And-Branching-Algorithm-Implementation/28-Linear-And-Branching-Algorithm-Implementation.pptx
@@ -5,10 +5,10 @@
     <p:sldMasterId id="2147483675" r:id="rId2"/>
   </p:sldMasterIdLst>
   <p:notesMasterIdLst>
-    <p:notesMasterId r:id="rId37"/>
+    <p:notesMasterId r:id="rId41"/>
   </p:notesMasterIdLst>
   <p:handoutMasterIdLst>
-    <p:handoutMasterId r:id="rId38"/>
+    <p:handoutMasterId r:id="rId42"/>
   </p:handoutMasterIdLst>
   <p:sldIdLst>
     <p:sldId id="503" r:id="rId3"/>
@@ -36,15 +36,19 @@
     <p:sldId id="615" r:id="rId25"/>
     <p:sldId id="616" r:id="rId26"/>
     <p:sldId id="617" r:id="rId27"/>
-    <p:sldId id="607" r:id="rId28"/>
-    <p:sldId id="608" r:id="rId29"/>
-    <p:sldId id="609" r:id="rId30"/>
-    <p:sldId id="610" r:id="rId31"/>
-    <p:sldId id="612" r:id="rId32"/>
-    <p:sldId id="613" r:id="rId33"/>
-    <p:sldId id="586" r:id="rId34"/>
-    <p:sldId id="504" r:id="rId35"/>
-    <p:sldId id="505" r:id="rId36"/>
+    <p:sldId id="618" r:id="rId28"/>
+    <p:sldId id="619" r:id="rId29"/>
+    <p:sldId id="620" r:id="rId30"/>
+    <p:sldId id="621" r:id="rId31"/>
+    <p:sldId id="607" r:id="rId32"/>
+    <p:sldId id="608" r:id="rId33"/>
+    <p:sldId id="609" r:id="rId34"/>
+    <p:sldId id="610" r:id="rId35"/>
+    <p:sldId id="612" r:id="rId36"/>
+    <p:sldId id="613" r:id="rId37"/>
+    <p:sldId id="586" r:id="rId38"/>
+    <p:sldId id="504" r:id="rId39"/>
+    <p:sldId id="505" r:id="rId40"/>
   </p:sldIdLst>
   <p:sldSz cx="12192000" cy="6858000"/>
   <p:notesSz cx="6858000" cy="9144000"/>
@@ -191,6 +195,14 @@
             <p14:sldId id="617"/>
           </p14:sldIdLst>
         </p14:section>
+        <p14:section name="Дебъгване" id="{415AEA19-58D6-4206-8576-AB83077339C6}">
+          <p14:sldIdLst>
+            <p14:sldId id="618"/>
+            <p14:sldId id="619"/>
+            <p14:sldId id="620"/>
+            <p14:sldId id="621"/>
+          </p14:sldIdLst>
+        </p14:section>
         <p14:section name="Серии от проверки" id="{E94E5F2C-9FC3-451E-A69F-2DAC55A543F2}">
           <p14:sldIdLst>
             <p14:sldId id="607"/>
@@ -329,7 +341,7 @@
           <a:p>
             <a:fld id="{4E087215-0C8F-4762-A664-737A353EC9A4}" type="datetimeFigureOut">
               <a:rPr lang="bg-BG" smtClean="0"/>
-              <a:t>11.11.2024 г.</a:t>
+              <a:t>19.11.2024 г.</a:t>
             </a:fld>
             <a:endParaRPr lang="bg-BG"/>
           </a:p>
@@ -525,7 +537,7 @@
           <a:p>
             <a:fld id="{72D84649-876A-46C9-8472-14CB09C070D8}" type="datetimeFigureOut">
               <a:rPr lang="en-US" smtClean="0"/>
-              <a:t>11/11/2024</a:t>
+              <a:t>11/19/2024</a:t>
             </a:fld>
             <a:endParaRPr lang="en-US"/>
           </a:p>
@@ -1310,7 +1322,7 @@
             <a:fld id="{3EBA5BD7-F043-4D1B-AA17-CD412FC534DE}" type="slidenum">
               <a:rPr lang="en-US" smtClean="0"/>
               <a:pPr/>
-              <a:t>32</a:t>
+              <a:t>36</a:t>
             </a:fld>
             <a:endParaRPr lang="en-US" dirty="0"/>
           </a:p>
@@ -1501,7 +1513,7 @@
             <a:fld id="{3EBA5BD7-F043-4D1B-AA17-CD412FC534DE}" type="slidenum">
               <a:rPr lang="en-US" smtClean="0"/>
               <a:pPr/>
-              <a:t>33</a:t>
+              <a:t>37</a:t>
             </a:fld>
             <a:endParaRPr lang="en-US" dirty="0"/>
           </a:p>
@@ -1731,7 +1743,7 @@
             <a:fld id="{3EBA5BD7-F043-4D1B-AA17-CD412FC534DE}" type="slidenum">
               <a:rPr lang="en-US" smtClean="0"/>
               <a:pPr/>
-              <a:t>34</a:t>
+              <a:t>38</a:t>
             </a:fld>
             <a:endParaRPr lang="en-US" dirty="0"/>
           </a:p>
@@ -14791,6 +14803,14 @@
               <a:rPr lang="bg-BG" b="1" dirty="0" smtClean="0"/>
               <a:t>форматиране</a:t>
             </a:r>
+            <a:endParaRPr lang="en-US" b="1" dirty="0" smtClean="0"/>
+          </a:p>
+          <a:p>
+            <a:r>
+              <a:rPr lang="bg-BG" dirty="0" smtClean="0"/>
+              <a:t>Дебъгване</a:t>
+            </a:r>
+            <a:endParaRPr lang="bg-BG" dirty="0" smtClean="0"/>
           </a:p>
           <a:p>
             <a:r>
@@ -15151,6 +15171,55 @@
                                           <p:spTgt spid="444419">
                                             <p:txEl>
                                               <p:pRg st="5" end="5"/>
+                                            </p:txEl>
+                                          </p:spTgt>
+                                        </p:tgtEl>
+                                        <p:attrNameLst>
+                                          <p:attrName>style.visibility</p:attrName>
+                                        </p:attrNameLst>
+                                      </p:cBhvr>
+                                      <p:to>
+                                        <p:strVal val="visible"/>
+                                      </p:to>
+                                    </p:set>
+                                  </p:childTnLst>
+                                </p:cTn>
+                              </p:par>
+                            </p:childTnLst>
+                          </p:cTn>
+                        </p:par>
+                      </p:childTnLst>
+                    </p:cTn>
+                  </p:par>
+                  <p:par>
+                    <p:cTn id="23" fill="hold">
+                      <p:stCondLst>
+                        <p:cond delay="indefinite"/>
+                      </p:stCondLst>
+                      <p:childTnLst>
+                        <p:par>
+                          <p:cTn id="24" fill="hold">
+                            <p:stCondLst>
+                              <p:cond delay="0"/>
+                            </p:stCondLst>
+                            <p:childTnLst>
+                              <p:par>
+                                <p:cTn id="25" presetID="1" presetClass="entr" presetSubtype="0" fill="hold" nodeType="clickEffect">
+                                  <p:stCondLst>
+                                    <p:cond delay="0"/>
+                                  </p:stCondLst>
+                                  <p:childTnLst>
+                                    <p:set>
+                                      <p:cBhvr>
+                                        <p:cTn id="26" dur="1" fill="hold">
+                                          <p:stCondLst>
+                                            <p:cond delay="0"/>
+                                          </p:stCondLst>
+                                        </p:cTn>
+                                        <p:tgtEl>
+                                          <p:spTgt spid="444419">
+                                            <p:txEl>
+                                              <p:pRg st="6" end="6"/>
                                             </p:txEl>
                                           </p:spTgt>
                                         </p:tgtEl>
@@ -19478,6 +19547,1663 @@
       </p:grpSpPr>
       <p:sp>
         <p:nvSpPr>
+          <p:cNvPr id="2" name="Title 1">
+            <a:extLst>
+              <a:ext uri="{FF2B5EF4-FFF2-40B4-BE49-F238E27FC236}">
+                <a16:creationId xmlns:a16="http://schemas.microsoft.com/office/drawing/2014/main" id="{BBC22201-BAEA-468F-B23B-EB38A3C796A7}"/>
+              </a:ext>
+            </a:extLst>
+          </p:cNvPr>
+          <p:cNvSpPr>
+            <a:spLocks noGrp="1"/>
+          </p:cNvSpPr>
+          <p:nvPr>
+            <p:ph type="title" sz="quarter" idx="10"/>
+          </p:nvPr>
+        </p:nvSpPr>
+        <p:spPr/>
+        <p:txBody>
+          <a:bodyPr/>
+          <a:lstStyle/>
+          <a:p>
+            <a:r>
+              <a:rPr lang="bg-BG"/>
+              <a:t>Дебъгване</a:t>
+            </a:r>
+          </a:p>
+        </p:txBody>
+      </p:sp>
+      <p:pic>
+        <p:nvPicPr>
+          <p:cNvPr id="5" name="Picture 4">
+            <a:extLst>
+              <a:ext uri="{FF2B5EF4-FFF2-40B4-BE49-F238E27FC236}">
+                <a16:creationId xmlns:a16="http://schemas.microsoft.com/office/drawing/2014/main" id="{68101FEB-F0AD-4A5D-8FBF-F51C6208CA6F}"/>
+              </a:ext>
+            </a:extLst>
+          </p:cNvPr>
+          <p:cNvPicPr>
+            <a:picLocks noChangeAspect="1"/>
+          </p:cNvPicPr>
+          <p:nvPr/>
+        </p:nvPicPr>
+        <p:blipFill>
+          <a:blip r:embed="rId2">
+            <a:duotone>
+              <a:schemeClr val="bg2">
+                <a:shade val="45000"/>
+                <a:satMod val="135000"/>
+              </a:schemeClr>
+              <a:prstClr val="white"/>
+            </a:duotone>
+            <a:extLst>
+              <a:ext uri="{BEBA8EAE-BF5A-486C-A8C5-ECC9F3942E4B}">
+                <a14:imgProps xmlns:a14="http://schemas.microsoft.com/office/drawing/2010/main">
+                  <a14:imgLayer r:embed="rId3">
+                    <a14:imgEffect>
+                      <a14:artisticPhotocopy/>
+                    </a14:imgEffect>
+                  </a14:imgLayer>
+                </a14:imgProps>
+              </a:ext>
+              <a:ext uri="{28A0092B-C50C-407E-A947-70E740481C1C}">
+                <a14:useLocalDpi xmlns:a14="http://schemas.microsoft.com/office/drawing/2010/main" val="0"/>
+              </a:ext>
+            </a:extLst>
+          </a:blip>
+          <a:stretch>
+            <a:fillRect/>
+          </a:stretch>
+        </p:blipFill>
+        <p:spPr>
+          <a:xfrm>
+            <a:off x="4985908" y="1524001"/>
+            <a:ext cx="2220185" cy="2220185"/>
+          </a:xfrm>
+          <a:prstGeom prst="rect">
+            <a:avLst/>
+          </a:prstGeom>
+        </p:spPr>
+      </p:pic>
+      <p:sp>
+        <p:nvSpPr>
+          <p:cNvPr id="7" name="Subtitle 6">
+            <a:extLst>
+              <a:ext uri="{FF2B5EF4-FFF2-40B4-BE49-F238E27FC236}">
+                <a16:creationId xmlns:a16="http://schemas.microsoft.com/office/drawing/2014/main" id="{74AF53BC-2E9A-4833-9CBE-AF631DA486ED}"/>
+              </a:ext>
+            </a:extLst>
+          </p:cNvPr>
+          <p:cNvSpPr>
+            <a:spLocks noGrp="1"/>
+          </p:cNvSpPr>
+          <p:nvPr>
+            <p:ph type="subTitle" sz="quarter" idx="11"/>
+          </p:nvPr>
+        </p:nvSpPr>
+        <p:spPr/>
+        <p:txBody>
+          <a:bodyPr/>
+          <a:lstStyle/>
+          <a:p>
+            <a:r>
+              <a:rPr lang="bg-BG"/>
+              <a:t>Прости операции с дебъгер</a:t>
+            </a:r>
+          </a:p>
+        </p:txBody>
+      </p:sp>
+    </p:spTree>
+    <p:extLst>
+      <p:ext uri="{BB962C8B-B14F-4D97-AF65-F5344CB8AC3E}">
+        <p14:creationId xmlns:p14="http://schemas.microsoft.com/office/powerpoint/2010/main" val="4113272693"/>
+      </p:ext>
+    </p:extLst>
+  </p:cSld>
+  <p:clrMapOvr>
+    <a:masterClrMapping/>
+  </p:clrMapOvr>
+  <mc:AlternateContent xmlns:mc="http://schemas.openxmlformats.org/markup-compatibility/2006" xmlns:p14="http://schemas.microsoft.com/office/powerpoint/2010/main">
+    <mc:Choice Requires="p14">
+      <p:transition spd="slow" p14:dur="2000" advClick="0" advTm="5000"/>
+    </mc:Choice>
+    <mc:Fallback xmlns="">
+      <p:transition spd="slow" advClick="0" advTm="5000"/>
+    </mc:Fallback>
+  </mc:AlternateContent>
+</p:sld>
+</file>
+
+<file path=ppt/slides/slide27.xml><?xml version="1.0" encoding="utf-8"?>
+<p:sld xmlns:a="http://schemas.openxmlformats.org/drawingml/2006/main" xmlns:r="http://schemas.openxmlformats.org/officeDocument/2006/relationships" xmlns:p="http://schemas.openxmlformats.org/presentationml/2006/main">
+  <p:cSld>
+    <p:spTree>
+      <p:nvGrpSpPr>
+        <p:cNvPr id="1" name=""/>
+        <p:cNvGrpSpPr/>
+        <p:nvPr/>
+      </p:nvGrpSpPr>
+      <p:grpSpPr>
+        <a:xfrm>
+          <a:off x="0" y="0"/>
+          <a:ext cx="0" cy="0"/>
+          <a:chOff x="0" y="0"/>
+          <a:chExt cx="0" cy="0"/>
+        </a:xfrm>
+      </p:grpSpPr>
+      <p:pic>
+        <p:nvPicPr>
+          <p:cNvPr id="5" name="Picture 4"/>
+          <p:cNvPicPr>
+            <a:picLocks noChangeAspect="1"/>
+          </p:cNvPicPr>
+          <p:nvPr/>
+        </p:nvPicPr>
+        <p:blipFill>
+          <a:blip r:embed="rId2"/>
+          <a:stretch>
+            <a:fillRect/>
+          </a:stretch>
+        </p:blipFill>
+        <p:spPr>
+          <a:xfrm>
+            <a:off x="5106000" y="3294000"/>
+            <a:ext cx="4680000" cy="3393316"/>
+          </a:xfrm>
+          <a:prstGeom prst="rect">
+            <a:avLst/>
+          </a:prstGeom>
+        </p:spPr>
+      </p:pic>
+      <p:sp>
+        <p:nvSpPr>
+          <p:cNvPr id="3" name="Text Placeholder 2">
+            <a:extLst>
+              <a:ext uri="{FF2B5EF4-FFF2-40B4-BE49-F238E27FC236}">
+                <a16:creationId xmlns:a16="http://schemas.microsoft.com/office/drawing/2014/main" id="{E791523A-C4BB-413F-AFB1-48142DE8C55F}"/>
+              </a:ext>
+            </a:extLst>
+          </p:cNvPr>
+          <p:cNvSpPr>
+            <a:spLocks noGrp="1"/>
+          </p:cNvSpPr>
+          <p:nvPr>
+            <p:ph type="body" sz="quarter" idx="10"/>
+          </p:nvPr>
+        </p:nvSpPr>
+        <p:spPr>
+          <a:xfrm>
+            <a:off x="1685999" y="1143000"/>
+            <a:ext cx="10250737" cy="5276048"/>
+          </a:xfrm>
+        </p:spPr>
+        <p:txBody>
+          <a:bodyPr/>
+          <a:lstStyle/>
+          <a:p>
+            <a:r>
+              <a:rPr lang="bg-BG" sz="3600" dirty="0" smtClean="0"/>
+              <a:t>͏</a:t>
+            </a:r>
+            <a:r>
+              <a:rPr lang="bg-BG" sz="3600" b="1" dirty="0" smtClean="0">
+                <a:solidFill>
+                  <a:schemeClr val="bg1"/>
+                </a:solidFill>
+              </a:rPr>
+              <a:t>Дебъгване</a:t>
+            </a:r>
+            <a:r>
+              <a:rPr lang="bg-BG" sz="3600" dirty="0" smtClean="0"/>
+              <a:t> – процес </a:t>
+            </a:r>
+            <a:r>
+              <a:rPr lang="bg-BG" sz="3600" dirty="0"/>
+              <a:t>на </a:t>
+            </a:r>
+            <a:r>
+              <a:rPr lang="bg-BG" sz="3600" b="1" dirty="0"/>
+              <a:t>проследяване</a:t>
+            </a:r>
+            <a:r>
+              <a:rPr lang="bg-BG" sz="3600" dirty="0"/>
+              <a:t> на </a:t>
+            </a:r>
+            <a:r>
+              <a:rPr lang="bg-BG" sz="3600" b="1" dirty="0"/>
+              <a:t>изпълнението</a:t>
+            </a:r>
+            <a:r>
+              <a:rPr lang="bg-BG" sz="3600" dirty="0"/>
+              <a:t> на програмата</a:t>
+            </a:r>
+          </a:p>
+          <a:p>
+            <a:pPr lvl="1"/>
+            <a:r>
+              <a:rPr lang="bg-BG" sz="3400" dirty="0"/>
+              <a:t>Това ни позволява да </a:t>
+            </a:r>
+            <a:r>
+              <a:rPr lang="bg-BG" sz="3400" b="1" dirty="0"/>
+              <a:t>откриваме грешки </a:t>
+            </a:r>
+            <a:r>
+              <a:rPr lang="bg-BG" sz="3400" dirty="0"/>
+              <a:t>(</a:t>
+            </a:r>
+            <a:r>
+              <a:rPr lang="bg-BG" sz="3400" b="1" dirty="0"/>
+              <a:t>бъгове</a:t>
+            </a:r>
+            <a:r>
+              <a:rPr lang="bg-BG" sz="3400" dirty="0"/>
+              <a:t>)</a:t>
+            </a:r>
+          </a:p>
+        </p:txBody>
+      </p:sp>
+      <p:sp>
+        <p:nvSpPr>
+          <p:cNvPr id="4" name="Title 3"/>
+          <p:cNvSpPr>
+            <a:spLocks noGrp="1"/>
+          </p:cNvSpPr>
+          <p:nvPr>
+            <p:ph type="title"/>
+          </p:nvPr>
+        </p:nvSpPr>
+        <p:spPr/>
+        <p:txBody>
+          <a:bodyPr/>
+          <a:lstStyle/>
+          <a:p>
+            <a:r>
+              <a:rPr lang="bg-BG" dirty="0"/>
+              <a:t>Дебъгване</a:t>
+            </a:r>
+            <a:endParaRPr lang="en-GB" dirty="0"/>
+          </a:p>
+        </p:txBody>
+      </p:sp>
+      <p:sp>
+        <p:nvSpPr>
+          <p:cNvPr id="8" name="Slide Number">
+            <a:extLst>
+              <a:ext uri="{FF2B5EF4-FFF2-40B4-BE49-F238E27FC236}">
+                <a16:creationId xmlns:a16="http://schemas.microsoft.com/office/drawing/2014/main" id="{8CB18A96-5B00-4D6A-A4E7-26DA8C321AF7}"/>
+              </a:ext>
+            </a:extLst>
+          </p:cNvPr>
+          <p:cNvSpPr txBox="1">
+            <a:spLocks/>
+          </p:cNvSpPr>
+          <p:nvPr/>
+        </p:nvSpPr>
+        <p:spPr>
+          <a:xfrm>
+            <a:off x="11753030" y="6507000"/>
+            <a:ext cx="367414" cy="297000"/>
+          </a:xfrm>
+          <a:prstGeom prst="rect">
+            <a:avLst/>
+          </a:prstGeom>
+        </p:spPr>
+        <p:txBody>
+          <a:bodyPr vert="horz" lIns="91440" tIns="45720" rIns="91440" bIns="45720" rtlCol="0" anchor="b"/>
+          <a:lstStyle>
+            <a:defPPr>
+              <a:defRPr lang="en-US"/>
+            </a:defPPr>
+            <a:lvl1pPr marL="0" algn="r" defTabSz="914400" rtl="0" eaLnBrk="1" latinLnBrk="0" hangingPunct="1">
+              <a:defRPr sz="1000" kern="1200">
+                <a:solidFill>
+                  <a:schemeClr val="tx1"/>
+                </a:solidFill>
+                <a:latin typeface="+mn-lt"/>
+                <a:ea typeface="+mn-ea"/>
+                <a:cs typeface="+mn-cs"/>
+              </a:defRPr>
+            </a:lvl1pPr>
+            <a:lvl2pPr marL="457200" algn="l" defTabSz="914400" rtl="0" eaLnBrk="1" latinLnBrk="0" hangingPunct="1">
+              <a:defRPr sz="1800" kern="1200">
+                <a:solidFill>
+                  <a:schemeClr val="tx1"/>
+                </a:solidFill>
+                <a:latin typeface="+mn-lt"/>
+                <a:ea typeface="+mn-ea"/>
+                <a:cs typeface="+mn-cs"/>
+              </a:defRPr>
+            </a:lvl2pPr>
+            <a:lvl3pPr marL="914400" algn="l" defTabSz="914400" rtl="0" eaLnBrk="1" latinLnBrk="0" hangingPunct="1">
+              <a:defRPr sz="1800" kern="1200">
+                <a:solidFill>
+                  <a:schemeClr val="tx1"/>
+                </a:solidFill>
+                <a:latin typeface="+mn-lt"/>
+                <a:ea typeface="+mn-ea"/>
+                <a:cs typeface="+mn-cs"/>
+              </a:defRPr>
+            </a:lvl3pPr>
+            <a:lvl4pPr marL="1371600" algn="l" defTabSz="914400" rtl="0" eaLnBrk="1" latinLnBrk="0" hangingPunct="1">
+              <a:defRPr sz="1800" kern="1200">
+                <a:solidFill>
+                  <a:schemeClr val="tx1"/>
+                </a:solidFill>
+                <a:latin typeface="+mn-lt"/>
+                <a:ea typeface="+mn-ea"/>
+                <a:cs typeface="+mn-cs"/>
+              </a:defRPr>
+            </a:lvl4pPr>
+            <a:lvl5pPr marL="1828800" algn="l" defTabSz="914400" rtl="0" eaLnBrk="1" latinLnBrk="0" hangingPunct="1">
+              <a:defRPr sz="1800" kern="1200">
+                <a:solidFill>
+                  <a:schemeClr val="tx1"/>
+                </a:solidFill>
+                <a:latin typeface="+mn-lt"/>
+                <a:ea typeface="+mn-ea"/>
+                <a:cs typeface="+mn-cs"/>
+              </a:defRPr>
+            </a:lvl5pPr>
+            <a:lvl6pPr marL="2286000" algn="l" defTabSz="914400" rtl="0" eaLnBrk="1" latinLnBrk="0" hangingPunct="1">
+              <a:defRPr sz="1800" kern="1200">
+                <a:solidFill>
+                  <a:schemeClr val="tx1"/>
+                </a:solidFill>
+                <a:latin typeface="+mn-lt"/>
+                <a:ea typeface="+mn-ea"/>
+                <a:cs typeface="+mn-cs"/>
+              </a:defRPr>
+            </a:lvl6pPr>
+            <a:lvl7pPr marL="2743200" algn="l" defTabSz="914400" rtl="0" eaLnBrk="1" latinLnBrk="0" hangingPunct="1">
+              <a:defRPr sz="1800" kern="1200">
+                <a:solidFill>
+                  <a:schemeClr val="tx1"/>
+                </a:solidFill>
+                <a:latin typeface="+mn-lt"/>
+                <a:ea typeface="+mn-ea"/>
+                <a:cs typeface="+mn-cs"/>
+              </a:defRPr>
+            </a:lvl7pPr>
+            <a:lvl8pPr marL="3200400" algn="l" defTabSz="914400" rtl="0" eaLnBrk="1" latinLnBrk="0" hangingPunct="1">
+              <a:defRPr sz="1800" kern="1200">
+                <a:solidFill>
+                  <a:schemeClr val="tx1"/>
+                </a:solidFill>
+                <a:latin typeface="+mn-lt"/>
+                <a:ea typeface="+mn-ea"/>
+                <a:cs typeface="+mn-cs"/>
+              </a:defRPr>
+            </a:lvl8pPr>
+            <a:lvl9pPr marL="3657600" algn="l" defTabSz="914400" rtl="0" eaLnBrk="1" latinLnBrk="0" hangingPunct="1">
+              <a:defRPr sz="1800" kern="1200">
+                <a:solidFill>
+                  <a:schemeClr val="tx1"/>
+                </a:solidFill>
+                <a:latin typeface="+mn-lt"/>
+                <a:ea typeface="+mn-ea"/>
+                <a:cs typeface="+mn-cs"/>
+              </a:defRPr>
+            </a:lvl9pPr>
+          </a:lstStyle>
+          <a:p>
+            <a:fld id="{2BF067CD-8E6B-4360-9AA8-C5DF2A48A6D1}" type="slidenum">
+              <a:rPr lang="en-US" smtClean="0"/>
+              <a:pPr/>
+              <a:t>27</a:t>
+            </a:fld>
+            <a:endParaRPr lang="en-US" dirty="0"/>
+          </a:p>
+        </p:txBody>
+      </p:sp>
+      <p:sp>
+        <p:nvSpPr>
+          <p:cNvPr id="2" name="Rounded Rectangular Callout 1"/>
+          <p:cNvSpPr/>
+          <p:nvPr/>
+        </p:nvSpPr>
+        <p:spPr bwMode="auto">
+          <a:xfrm>
+            <a:off x="2676000" y="4059000"/>
+            <a:ext cx="2160000" cy="630000"/>
+          </a:xfrm>
+          <a:prstGeom prst="wedgeRoundRectCallout">
+            <a:avLst>
+              <a:gd name="adj1" fmla="val 76149"/>
+              <a:gd name="adj2" fmla="val 94168"/>
+              <a:gd name="adj3" fmla="val 16667"/>
+            </a:avLst>
+          </a:prstGeom>
+          <a:solidFill>
+            <a:schemeClr val="dk2">
+              <a:alpha val="80000"/>
+            </a:schemeClr>
+          </a:solidFill>
+          <a:ln w="19050">
+            <a:solidFill>
+              <a:schemeClr val="tx1">
+                <a:lumMod val="75000"/>
+                <a:alpha val="80000"/>
+              </a:schemeClr>
+            </a:solidFill>
+          </a:ln>
+          <a:effectLst/>
+        </p:spPr>
+        <p:style>
+          <a:lnRef idx="2">
+            <a:schemeClr val="accent1">
+              <a:shade val="50000"/>
+            </a:schemeClr>
+          </a:lnRef>
+          <a:fillRef idx="1001">
+            <a:schemeClr val="dk2"/>
+          </a:fillRef>
+          <a:effectRef idx="0">
+            <a:schemeClr val="accent1"/>
+          </a:effectRef>
+          <a:fontRef idx="minor">
+            <a:schemeClr val="lt1"/>
+          </a:fontRef>
+        </p:style>
+        <p:txBody>
+          <a:bodyPr rot="0" spcFirstLastPara="0" vertOverflow="overflow" horzOverflow="overflow" vert="horz" wrap="square" lIns="91440" tIns="45720" rIns="91440" bIns="45720" numCol="1" spcCol="0" rtlCol="0" fromWordArt="0" anchor="ctr" anchorCtr="0" forceAA="0" compatLnSpc="1">
+            <a:prstTxWarp prst="textNoShape">
+              <a:avLst/>
+            </a:prstTxWarp>
+            <a:noAutofit/>
+          </a:bodyPr>
+          <a:lstStyle/>
+          <a:p>
+            <a:pPr algn="ctr"/>
+            <a:r>
+              <a:rPr lang="en-US" sz="2800" b="1" dirty="0" smtClean="0">
+                <a:solidFill>
+                  <a:srgbClr val="FFFFFF"/>
+                </a:solidFill>
+                <a:effectLst>
+                  <a:outerShdw blurRad="38100" dist="38100" dir="2700000" algn="tl">
+                    <a:srgbClr val="000000">
+                      <a:alpha val="43137"/>
+                    </a:srgbClr>
+                  </a:outerShdw>
+                </a:effectLst>
+              </a:rPr>
+              <a:t>Breakpoint</a:t>
+            </a:r>
+            <a:endParaRPr lang="en-US" sz="2800" b="1" dirty="0">
+              <a:solidFill>
+                <a:srgbClr val="FFFFFF"/>
+              </a:solidFill>
+              <a:effectLst>
+                <a:outerShdw blurRad="38100" dist="38100" dir="2700000" algn="tl">
+                  <a:srgbClr val="000000">
+                    <a:alpha val="43137"/>
+                  </a:srgbClr>
+                </a:outerShdw>
+              </a:effectLst>
+            </a:endParaRPr>
+          </a:p>
+        </p:txBody>
+      </p:sp>
+    </p:spTree>
+    <p:extLst>
+      <p:ext uri="{BB962C8B-B14F-4D97-AF65-F5344CB8AC3E}">
+        <p14:creationId xmlns:p14="http://schemas.microsoft.com/office/powerpoint/2010/main" val="3890379570"/>
+      </p:ext>
+    </p:extLst>
+  </p:cSld>
+  <p:clrMapOvr>
+    <a:masterClrMapping/>
+  </p:clrMapOvr>
+  <mc:AlternateContent xmlns:mc="http://schemas.openxmlformats.org/markup-compatibility/2006" xmlns:p14="http://schemas.microsoft.com/office/powerpoint/2010/main">
+    <mc:Choice Requires="p14">
+      <p:transition spd="slow" p14:dur="2000" advClick="0" advTm="5000"/>
+    </mc:Choice>
+    <mc:Fallback xmlns="">
+      <p:transition spd="slow" advClick="0" advTm="5000"/>
+    </mc:Fallback>
+  </mc:AlternateContent>
+  <p:timing>
+    <p:tnLst>
+      <p:par>
+        <p:cTn id="1" dur="indefinite" restart="never" nodeType="tmRoot">
+          <p:childTnLst>
+            <p:seq concurrent="1" nextAc="seek">
+              <p:cTn id="2" dur="indefinite" nodeType="mainSeq">
+                <p:childTnLst>
+                  <p:par>
+                    <p:cTn id="3" fill="hold">
+                      <p:stCondLst>
+                        <p:cond delay="indefinite"/>
+                      </p:stCondLst>
+                      <p:childTnLst>
+                        <p:par>
+                          <p:cTn id="4" fill="hold">
+                            <p:stCondLst>
+                              <p:cond delay="0"/>
+                            </p:stCondLst>
+                            <p:childTnLst>
+                              <p:par>
+                                <p:cTn id="5" presetID="1" presetClass="entr" presetSubtype="0" fill="hold" nodeType="clickEffect">
+                                  <p:stCondLst>
+                                    <p:cond delay="0"/>
+                                  </p:stCondLst>
+                                  <p:childTnLst>
+                                    <p:set>
+                                      <p:cBhvr>
+                                        <p:cTn id="6" dur="1" fill="hold">
+                                          <p:stCondLst>
+                                            <p:cond delay="0"/>
+                                          </p:stCondLst>
+                                        </p:cTn>
+                                        <p:tgtEl>
+                                          <p:spTgt spid="3">
+                                            <p:txEl>
+                                              <p:pRg st="1" end="1"/>
+                                            </p:txEl>
+                                          </p:spTgt>
+                                        </p:tgtEl>
+                                        <p:attrNameLst>
+                                          <p:attrName>style.visibility</p:attrName>
+                                        </p:attrNameLst>
+                                      </p:cBhvr>
+                                      <p:to>
+                                        <p:strVal val="visible"/>
+                                      </p:to>
+                                    </p:set>
+                                  </p:childTnLst>
+                                </p:cTn>
+                              </p:par>
+                            </p:childTnLst>
+                          </p:cTn>
+                        </p:par>
+                      </p:childTnLst>
+                    </p:cTn>
+                  </p:par>
+                </p:childTnLst>
+              </p:cTn>
+              <p:prevCondLst>
+                <p:cond evt="onPrev" delay="0">
+                  <p:tgtEl>
+                    <p:sldTgt/>
+                  </p:tgtEl>
+                </p:cond>
+              </p:prevCondLst>
+              <p:nextCondLst>
+                <p:cond evt="onNext" delay="0">
+                  <p:tgtEl>
+                    <p:sldTgt/>
+                  </p:tgtEl>
+                </p:cond>
+              </p:nextCondLst>
+            </p:seq>
+          </p:childTnLst>
+        </p:cTn>
+      </p:par>
+    </p:tnLst>
+  </p:timing>
+</p:sld>
+</file>
+
+<file path=ppt/slides/slide28.xml><?xml version="1.0" encoding="utf-8"?>
+<p:sld xmlns:a="http://schemas.openxmlformats.org/drawingml/2006/main" xmlns:r="http://schemas.openxmlformats.org/officeDocument/2006/relationships" xmlns:p="http://schemas.openxmlformats.org/presentationml/2006/main">
+  <p:cSld>
+    <p:spTree>
+      <p:nvGrpSpPr>
+        <p:cNvPr id="1" name=""/>
+        <p:cNvGrpSpPr/>
+        <p:nvPr/>
+      </p:nvGrpSpPr>
+      <p:grpSpPr>
+        <a:xfrm>
+          <a:off x="0" y="0"/>
+          <a:ext cx="0" cy="0"/>
+          <a:chOff x="0" y="0"/>
+          <a:chExt cx="0" cy="0"/>
+        </a:xfrm>
+      </p:grpSpPr>
+      <p:pic>
+        <p:nvPicPr>
+          <p:cNvPr id="5" name="Picture 4"/>
+          <p:cNvPicPr>
+            <a:picLocks noChangeAspect="1"/>
+          </p:cNvPicPr>
+          <p:nvPr/>
+        </p:nvPicPr>
+        <p:blipFill>
+          <a:blip r:embed="rId2"/>
+          <a:stretch>
+            <a:fillRect/>
+          </a:stretch>
+        </p:blipFill>
+        <p:spPr>
+          <a:xfrm>
+            <a:off x="6449901" y="3733025"/>
+            <a:ext cx="4146551" cy="3006529"/>
+          </a:xfrm>
+          <a:prstGeom prst="rect">
+            <a:avLst/>
+          </a:prstGeom>
+        </p:spPr>
+      </p:pic>
+      <p:sp>
+        <p:nvSpPr>
+          <p:cNvPr id="4" name="Title 3"/>
+          <p:cNvSpPr>
+            <a:spLocks noGrp="1"/>
+          </p:cNvSpPr>
+          <p:nvPr>
+            <p:ph type="title"/>
+          </p:nvPr>
+        </p:nvSpPr>
+        <p:spPr/>
+        <p:txBody>
+          <a:bodyPr/>
+          <a:lstStyle/>
+          <a:p>
+            <a:r>
+              <a:rPr lang="bg-BG" dirty="0"/>
+              <a:t>Дебъгване </a:t>
+            </a:r>
+            <a:r>
+              <a:rPr lang="bg-BG" dirty="0" smtClean="0"/>
+              <a:t>в</a:t>
+            </a:r>
+            <a:r>
+              <a:rPr lang="en-US" dirty="0" smtClean="0"/>
+              <a:t> Thonny</a:t>
+            </a:r>
+            <a:endParaRPr lang="en-GB" dirty="0"/>
+          </a:p>
+        </p:txBody>
+      </p:sp>
+      <p:sp>
+        <p:nvSpPr>
+          <p:cNvPr id="6" name="Text Placeholder 5">
+            <a:extLst>
+              <a:ext uri="{FF2B5EF4-FFF2-40B4-BE49-F238E27FC236}">
+                <a16:creationId xmlns:a16="http://schemas.microsoft.com/office/drawing/2014/main" id="{1424728D-C3ED-4376-8562-ED552A1B26C9}"/>
+              </a:ext>
+            </a:extLst>
+          </p:cNvPr>
+          <p:cNvSpPr>
+            <a:spLocks noGrp="1"/>
+          </p:cNvSpPr>
+          <p:nvPr>
+            <p:ph type="body" sz="quarter" idx="10"/>
+          </p:nvPr>
+        </p:nvSpPr>
+        <p:spPr>
+          <a:xfrm>
+            <a:off x="1927851" y="999969"/>
+            <a:ext cx="10033549" cy="5276048"/>
+          </a:xfrm>
+        </p:spPr>
+        <p:txBody>
+          <a:bodyPr>
+            <a:normAutofit/>
+          </a:bodyPr>
+          <a:lstStyle/>
+          <a:p>
+            <a:pPr>
+              <a:lnSpc>
+                <a:spcPct val="100000"/>
+              </a:lnSpc>
+            </a:pPr>
+            <a:r>
+              <a:rPr lang="bg-BG" sz="3000" dirty="0"/>
+              <a:t>Натискане </a:t>
+            </a:r>
+            <a:r>
+              <a:rPr lang="bg-BG" sz="3000" dirty="0" smtClean="0"/>
+              <a:t>на </a:t>
+            </a:r>
+            <a:r>
+              <a:rPr lang="bg-BG" sz="3000" b="1" dirty="0" smtClean="0"/>
+              <a:t>бутона</a:t>
+            </a:r>
+            <a:r>
+              <a:rPr lang="bg-BG" sz="3000" dirty="0" smtClean="0"/>
+              <a:t> </a:t>
+            </a:r>
+            <a:r>
+              <a:rPr lang="en-US" sz="3000" dirty="0" smtClean="0"/>
+              <a:t>[</a:t>
+            </a:r>
+            <a:r>
+              <a:rPr lang="en-US" sz="3000" b="1" dirty="0" smtClean="0">
+                <a:solidFill>
+                  <a:schemeClr val="bg1"/>
+                </a:solidFill>
+              </a:rPr>
+              <a:t>Debugger</a:t>
+            </a:r>
+            <a:r>
+              <a:rPr lang="en-US" sz="3000" dirty="0" smtClean="0"/>
+              <a:t>]</a:t>
+            </a:r>
+            <a:r>
+              <a:rPr lang="bg-BG" sz="3000" b="1" dirty="0" smtClean="0">
+                <a:solidFill>
+                  <a:schemeClr val="bg1"/>
+                </a:solidFill>
+              </a:rPr>
+              <a:t> </a:t>
+            </a:r>
+            <a:r>
+              <a:rPr lang="bg-BG" sz="3000" dirty="0"/>
+              <a:t>ще стартира програмата в </a:t>
+            </a:r>
+            <a:r>
+              <a:rPr lang="en-US" sz="3000" b="1" dirty="0" smtClean="0">
+                <a:solidFill>
+                  <a:schemeClr val="bg1"/>
+                </a:solidFill>
+              </a:rPr>
+              <a:t>debug</a:t>
+            </a:r>
+            <a:r>
+              <a:rPr lang="en-US" sz="3000" b="1" dirty="0" smtClean="0"/>
+              <a:t> </a:t>
+            </a:r>
+            <a:r>
+              <a:rPr lang="bg-BG" sz="3000" b="1" dirty="0" smtClean="0"/>
+              <a:t>режим</a:t>
+            </a:r>
+            <a:endParaRPr lang="bg-BG" sz="3000" b="1" dirty="0"/>
+          </a:p>
+          <a:p>
+            <a:pPr>
+              <a:lnSpc>
+                <a:spcPct val="100000"/>
+              </a:lnSpc>
+            </a:pPr>
+            <a:r>
+              <a:rPr lang="bg-BG" sz="3000" dirty="0"/>
+              <a:t>Можем да преминем към </a:t>
+            </a:r>
+            <a:r>
+              <a:rPr lang="bg-BG" sz="3000" b="1" dirty="0"/>
+              <a:t>следващата стъпка </a:t>
+            </a:r>
+            <a:r>
+              <a:rPr lang="bg-BG" sz="3000" dirty="0"/>
+              <a:t>с </a:t>
+            </a:r>
+            <a:r>
+              <a:rPr lang="en-US" sz="3000" dirty="0"/>
+              <a:t>[</a:t>
+            </a:r>
+            <a:r>
+              <a:rPr lang="bg-BG" sz="3000" b="1" dirty="0" smtClean="0">
+                <a:solidFill>
+                  <a:schemeClr val="bg1"/>
+                </a:solidFill>
+              </a:rPr>
+              <a:t>F</a:t>
+            </a:r>
+            <a:r>
+              <a:rPr lang="en-US" sz="3000" b="1" dirty="0">
+                <a:solidFill>
+                  <a:schemeClr val="bg1"/>
+                </a:solidFill>
+              </a:rPr>
+              <a:t>7</a:t>
+            </a:r>
+            <a:r>
+              <a:rPr lang="en-US" sz="3000" dirty="0" smtClean="0"/>
+              <a:t>]</a:t>
+            </a:r>
+            <a:endParaRPr lang="en-US" sz="3000" dirty="0"/>
+          </a:p>
+          <a:p>
+            <a:pPr>
+              <a:lnSpc>
+                <a:spcPct val="100000"/>
+              </a:lnSpc>
+            </a:pPr>
+            <a:r>
+              <a:rPr lang="bg-BG" sz="3000" dirty="0"/>
+              <a:t>Можем да създаваме</a:t>
+            </a:r>
+            <a:r>
+              <a:rPr lang="en-US" sz="3000" dirty="0"/>
+              <a:t> </a:t>
+            </a:r>
+            <a:r>
+              <a:rPr lang="bg-BG" sz="3000" b="1" dirty="0" smtClean="0">
+                <a:solidFill>
+                  <a:schemeClr val="bg1"/>
+                </a:solidFill>
+              </a:rPr>
+              <a:t>стопери</a:t>
+            </a:r>
+            <a:r>
+              <a:rPr lang="bg-BG" sz="3000" dirty="0" smtClean="0"/>
+              <a:t> </a:t>
+            </a:r>
+            <a:r>
+              <a:rPr lang="en-US" sz="3000" dirty="0"/>
+              <a:t>(</a:t>
+            </a:r>
+            <a:r>
+              <a:rPr lang="en-US" sz="3000" b="1" dirty="0" smtClean="0"/>
+              <a:t>breakpoints</a:t>
+            </a:r>
+            <a:r>
+              <a:rPr lang="en-US" sz="3000" dirty="0" smtClean="0"/>
+              <a:t>)</a:t>
+            </a:r>
+            <a:r>
+              <a:rPr lang="bg-BG" sz="3000" dirty="0" smtClean="0"/>
+              <a:t>,</a:t>
+            </a:r>
+            <a:r>
+              <a:rPr lang="en-US" sz="3000" dirty="0" smtClean="0"/>
+              <a:t> </a:t>
+            </a:r>
+            <a:r>
+              <a:rPr lang="bg-BG" sz="3000" dirty="0" smtClean="0"/>
+              <a:t>като цъкнем в най-лявата част на полето за писане на код</a:t>
+            </a:r>
+            <a:endParaRPr lang="bg-BG" sz="3000" dirty="0"/>
+          </a:p>
+        </p:txBody>
+      </p:sp>
+      <p:sp>
+        <p:nvSpPr>
+          <p:cNvPr id="8" name="AutoShape 7">
+            <a:extLst>
+              <a:ext uri="{FF2B5EF4-FFF2-40B4-BE49-F238E27FC236}">
+                <a16:creationId xmlns:a16="http://schemas.microsoft.com/office/drawing/2014/main" id="{672CF3A2-D953-4549-B78E-AFBF83CE8092}"/>
+              </a:ext>
+            </a:extLst>
+          </p:cNvPr>
+          <p:cNvSpPr>
+            <a:spLocks noChangeArrowheads="1"/>
+          </p:cNvSpPr>
+          <p:nvPr/>
+        </p:nvSpPr>
+        <p:spPr bwMode="auto">
+          <a:xfrm>
+            <a:off x="4116000" y="5397921"/>
+            <a:ext cx="2189977" cy="662392"/>
+          </a:xfrm>
+          <a:prstGeom prst="wedgeRoundRectCallout">
+            <a:avLst>
+              <a:gd name="adj1" fmla="val 87231"/>
+              <a:gd name="adj2" fmla="val -49280"/>
+              <a:gd name="adj3" fmla="val 16667"/>
+            </a:avLst>
+          </a:prstGeom>
+          <a:solidFill>
+            <a:schemeClr val="dk2">
+              <a:alpha val="80000"/>
+            </a:schemeClr>
+          </a:solidFill>
+          <a:ln w="19050">
+            <a:solidFill>
+              <a:schemeClr val="tx1">
+                <a:lumMod val="75000"/>
+                <a:alpha val="80000"/>
+              </a:schemeClr>
+            </a:solidFill>
+          </a:ln>
+          <a:effectLst/>
+        </p:spPr>
+        <p:style>
+          <a:lnRef idx="2">
+            <a:schemeClr val="accent1">
+              <a:shade val="50000"/>
+            </a:schemeClr>
+          </a:lnRef>
+          <a:fillRef idx="1001">
+            <a:schemeClr val="dk2"/>
+          </a:fillRef>
+          <a:effectRef idx="0">
+            <a:schemeClr val="accent1"/>
+          </a:effectRef>
+          <a:fontRef idx="minor">
+            <a:schemeClr val="lt1"/>
+          </a:fontRef>
+        </p:style>
+        <p:txBody>
+          <a:bodyPr rot="0" spcFirstLastPara="0" vertOverflow="overflow" horzOverflow="overflow" vert="horz" wrap="square" lIns="91440" tIns="45720" rIns="91440" bIns="45720" numCol="1" spcCol="0" rtlCol="0" fromWordArt="0" anchor="ctr" anchorCtr="0" forceAA="0" compatLnSpc="1">
+            <a:prstTxWarp prst="textNoShape">
+              <a:avLst/>
+            </a:prstTxWarp>
+            <a:noAutofit/>
+          </a:bodyPr>
+          <a:lstStyle/>
+          <a:p>
+            <a:pPr algn="ctr"/>
+            <a:r>
+              <a:rPr lang="en-US" sz="3000" b="1" dirty="0">
+                <a:solidFill>
+                  <a:srgbClr val="FFFFFF"/>
+                </a:solidFill>
+              </a:rPr>
+              <a:t>Breakpoint</a:t>
+            </a:r>
+            <a:endParaRPr lang="bg-BG" sz="3000" b="1" dirty="0">
+              <a:solidFill>
+                <a:srgbClr val="FFFFFF"/>
+              </a:solidFill>
+            </a:endParaRPr>
+          </a:p>
+        </p:txBody>
+      </p:sp>
+      <p:sp>
+        <p:nvSpPr>
+          <p:cNvPr id="9" name="AutoShape 7">
+            <a:extLst>
+              <a:ext uri="{FF2B5EF4-FFF2-40B4-BE49-F238E27FC236}">
+                <a16:creationId xmlns:a16="http://schemas.microsoft.com/office/drawing/2014/main" id="{D0162643-F30C-4A9B-8CB6-6656A57CA8EB}"/>
+              </a:ext>
+            </a:extLst>
+          </p:cNvPr>
+          <p:cNvSpPr>
+            <a:spLocks noChangeArrowheads="1"/>
+          </p:cNvSpPr>
+          <p:nvPr/>
+        </p:nvSpPr>
+        <p:spPr bwMode="auto">
+          <a:xfrm>
+            <a:off x="4099036" y="4059000"/>
+            <a:ext cx="2189977" cy="662392"/>
+          </a:xfrm>
+          <a:prstGeom prst="wedgeRoundRectCallout">
+            <a:avLst>
+              <a:gd name="adj1" fmla="val 85443"/>
+              <a:gd name="adj2" fmla="val 33929"/>
+              <a:gd name="adj3" fmla="val 16667"/>
+            </a:avLst>
+          </a:prstGeom>
+          <a:solidFill>
+            <a:schemeClr val="dk2">
+              <a:alpha val="80000"/>
+            </a:schemeClr>
+          </a:solidFill>
+          <a:ln w="19050">
+            <a:solidFill>
+              <a:schemeClr val="tx1">
+                <a:lumMod val="75000"/>
+                <a:alpha val="80000"/>
+              </a:schemeClr>
+            </a:solidFill>
+          </a:ln>
+          <a:effectLst/>
+        </p:spPr>
+        <p:style>
+          <a:lnRef idx="2">
+            <a:schemeClr val="accent1">
+              <a:shade val="50000"/>
+            </a:schemeClr>
+          </a:lnRef>
+          <a:fillRef idx="1001">
+            <a:schemeClr val="dk2"/>
+          </a:fillRef>
+          <a:effectRef idx="0">
+            <a:schemeClr val="accent1"/>
+          </a:effectRef>
+          <a:fontRef idx="minor">
+            <a:schemeClr val="lt1"/>
+          </a:fontRef>
+        </p:style>
+        <p:txBody>
+          <a:bodyPr rot="0" spcFirstLastPara="0" vertOverflow="overflow" horzOverflow="overflow" vert="horz" wrap="square" lIns="91440" tIns="45720" rIns="91440" bIns="45720" numCol="1" spcCol="0" rtlCol="0" fromWordArt="0" anchor="ctr" anchorCtr="0" forceAA="0" compatLnSpc="1">
+            <a:prstTxWarp prst="textNoShape">
+              <a:avLst/>
+            </a:prstTxWarp>
+            <a:noAutofit/>
+          </a:bodyPr>
+          <a:lstStyle/>
+          <a:p>
+            <a:pPr algn="ctr"/>
+            <a:r>
+              <a:rPr lang="en-US" sz="3000" b="1" dirty="0">
+                <a:solidFill>
+                  <a:srgbClr val="FFFFFF"/>
+                </a:solidFill>
+              </a:rPr>
+              <a:t>Breakpoint</a:t>
+            </a:r>
+            <a:endParaRPr lang="bg-BG" sz="3000" b="1" dirty="0">
+              <a:solidFill>
+                <a:srgbClr val="FFFFFF"/>
+              </a:solidFill>
+            </a:endParaRPr>
+          </a:p>
+        </p:txBody>
+      </p:sp>
+      <p:sp>
+        <p:nvSpPr>
+          <p:cNvPr id="10" name="Slide Number">
+            <a:extLst>
+              <a:ext uri="{FF2B5EF4-FFF2-40B4-BE49-F238E27FC236}">
+                <a16:creationId xmlns:a16="http://schemas.microsoft.com/office/drawing/2014/main" id="{6BFB1B87-5FAF-4DF9-82BA-C682590E5EC2}"/>
+              </a:ext>
+            </a:extLst>
+          </p:cNvPr>
+          <p:cNvSpPr txBox="1">
+            <a:spLocks/>
+          </p:cNvSpPr>
+          <p:nvPr/>
+        </p:nvSpPr>
+        <p:spPr>
+          <a:xfrm>
+            <a:off x="11753030" y="6507000"/>
+            <a:ext cx="367414" cy="297000"/>
+          </a:xfrm>
+          <a:prstGeom prst="rect">
+            <a:avLst/>
+          </a:prstGeom>
+        </p:spPr>
+        <p:txBody>
+          <a:bodyPr vert="horz" lIns="91440" tIns="45720" rIns="91440" bIns="45720" rtlCol="0" anchor="b"/>
+          <a:lstStyle>
+            <a:defPPr>
+              <a:defRPr lang="en-US"/>
+            </a:defPPr>
+            <a:lvl1pPr marL="0" algn="r" defTabSz="914400" rtl="0" eaLnBrk="1" latinLnBrk="0" hangingPunct="1">
+              <a:defRPr sz="1000" kern="1200">
+                <a:solidFill>
+                  <a:schemeClr val="tx1"/>
+                </a:solidFill>
+                <a:latin typeface="+mn-lt"/>
+                <a:ea typeface="+mn-ea"/>
+                <a:cs typeface="+mn-cs"/>
+              </a:defRPr>
+            </a:lvl1pPr>
+            <a:lvl2pPr marL="457200" algn="l" defTabSz="914400" rtl="0" eaLnBrk="1" latinLnBrk="0" hangingPunct="1">
+              <a:defRPr sz="1800" kern="1200">
+                <a:solidFill>
+                  <a:schemeClr val="tx1"/>
+                </a:solidFill>
+                <a:latin typeface="+mn-lt"/>
+                <a:ea typeface="+mn-ea"/>
+                <a:cs typeface="+mn-cs"/>
+              </a:defRPr>
+            </a:lvl2pPr>
+            <a:lvl3pPr marL="914400" algn="l" defTabSz="914400" rtl="0" eaLnBrk="1" latinLnBrk="0" hangingPunct="1">
+              <a:defRPr sz="1800" kern="1200">
+                <a:solidFill>
+                  <a:schemeClr val="tx1"/>
+                </a:solidFill>
+                <a:latin typeface="+mn-lt"/>
+                <a:ea typeface="+mn-ea"/>
+                <a:cs typeface="+mn-cs"/>
+              </a:defRPr>
+            </a:lvl3pPr>
+            <a:lvl4pPr marL="1371600" algn="l" defTabSz="914400" rtl="0" eaLnBrk="1" latinLnBrk="0" hangingPunct="1">
+              <a:defRPr sz="1800" kern="1200">
+                <a:solidFill>
+                  <a:schemeClr val="tx1"/>
+                </a:solidFill>
+                <a:latin typeface="+mn-lt"/>
+                <a:ea typeface="+mn-ea"/>
+                <a:cs typeface="+mn-cs"/>
+              </a:defRPr>
+            </a:lvl4pPr>
+            <a:lvl5pPr marL="1828800" algn="l" defTabSz="914400" rtl="0" eaLnBrk="1" latinLnBrk="0" hangingPunct="1">
+              <a:defRPr sz="1800" kern="1200">
+                <a:solidFill>
+                  <a:schemeClr val="tx1"/>
+                </a:solidFill>
+                <a:latin typeface="+mn-lt"/>
+                <a:ea typeface="+mn-ea"/>
+                <a:cs typeface="+mn-cs"/>
+              </a:defRPr>
+            </a:lvl5pPr>
+            <a:lvl6pPr marL="2286000" algn="l" defTabSz="914400" rtl="0" eaLnBrk="1" latinLnBrk="0" hangingPunct="1">
+              <a:defRPr sz="1800" kern="1200">
+                <a:solidFill>
+                  <a:schemeClr val="tx1"/>
+                </a:solidFill>
+                <a:latin typeface="+mn-lt"/>
+                <a:ea typeface="+mn-ea"/>
+                <a:cs typeface="+mn-cs"/>
+              </a:defRPr>
+            </a:lvl6pPr>
+            <a:lvl7pPr marL="2743200" algn="l" defTabSz="914400" rtl="0" eaLnBrk="1" latinLnBrk="0" hangingPunct="1">
+              <a:defRPr sz="1800" kern="1200">
+                <a:solidFill>
+                  <a:schemeClr val="tx1"/>
+                </a:solidFill>
+                <a:latin typeface="+mn-lt"/>
+                <a:ea typeface="+mn-ea"/>
+                <a:cs typeface="+mn-cs"/>
+              </a:defRPr>
+            </a:lvl7pPr>
+            <a:lvl8pPr marL="3200400" algn="l" defTabSz="914400" rtl="0" eaLnBrk="1" latinLnBrk="0" hangingPunct="1">
+              <a:defRPr sz="1800" kern="1200">
+                <a:solidFill>
+                  <a:schemeClr val="tx1"/>
+                </a:solidFill>
+                <a:latin typeface="+mn-lt"/>
+                <a:ea typeface="+mn-ea"/>
+                <a:cs typeface="+mn-cs"/>
+              </a:defRPr>
+            </a:lvl8pPr>
+            <a:lvl9pPr marL="3657600" algn="l" defTabSz="914400" rtl="0" eaLnBrk="1" latinLnBrk="0" hangingPunct="1">
+              <a:defRPr sz="1800" kern="1200">
+                <a:solidFill>
+                  <a:schemeClr val="tx1"/>
+                </a:solidFill>
+                <a:latin typeface="+mn-lt"/>
+                <a:ea typeface="+mn-ea"/>
+                <a:cs typeface="+mn-cs"/>
+              </a:defRPr>
+            </a:lvl9pPr>
+          </a:lstStyle>
+          <a:p>
+            <a:fld id="{2BF067CD-8E6B-4360-9AA8-C5DF2A48A6D1}" type="slidenum">
+              <a:rPr lang="en-US" smtClean="0"/>
+              <a:pPr/>
+              <a:t>28</a:t>
+            </a:fld>
+            <a:endParaRPr lang="en-US" dirty="0"/>
+          </a:p>
+        </p:txBody>
+      </p:sp>
+    </p:spTree>
+    <p:extLst>
+      <p:ext uri="{BB962C8B-B14F-4D97-AF65-F5344CB8AC3E}">
+        <p14:creationId xmlns:p14="http://schemas.microsoft.com/office/powerpoint/2010/main" val="460211944"/>
+      </p:ext>
+    </p:extLst>
+  </p:cSld>
+  <p:clrMapOvr>
+    <a:masterClrMapping/>
+  </p:clrMapOvr>
+  <mc:AlternateContent xmlns:mc="http://schemas.openxmlformats.org/markup-compatibility/2006" xmlns:p14="http://schemas.microsoft.com/office/powerpoint/2010/main">
+    <mc:Choice Requires="p14">
+      <p:transition spd="slow" p14:dur="2000" advClick="0" advTm="5000"/>
+    </mc:Choice>
+    <mc:Fallback xmlns="">
+      <p:transition spd="slow" advClick="0" advTm="5000"/>
+    </mc:Fallback>
+  </mc:AlternateContent>
+  <p:timing>
+    <p:tnLst>
+      <p:par>
+        <p:cTn id="1" dur="indefinite" restart="never" nodeType="tmRoot">
+          <p:childTnLst>
+            <p:seq concurrent="1" nextAc="seek">
+              <p:cTn id="2" dur="indefinite" nodeType="mainSeq">
+                <p:childTnLst>
+                  <p:par>
+                    <p:cTn id="3" fill="hold">
+                      <p:stCondLst>
+                        <p:cond delay="indefinite"/>
+                      </p:stCondLst>
+                      <p:childTnLst>
+                        <p:par>
+                          <p:cTn id="4" fill="hold">
+                            <p:stCondLst>
+                              <p:cond delay="0"/>
+                            </p:stCondLst>
+                            <p:childTnLst>
+                              <p:par>
+                                <p:cTn id="5" presetID="1" presetClass="entr" presetSubtype="0" fill="hold" nodeType="clickEffect">
+                                  <p:stCondLst>
+                                    <p:cond delay="0"/>
+                                  </p:stCondLst>
+                                  <p:childTnLst>
+                                    <p:set>
+                                      <p:cBhvr>
+                                        <p:cTn id="6" dur="1" fill="hold">
+                                          <p:stCondLst>
+                                            <p:cond delay="0"/>
+                                          </p:stCondLst>
+                                        </p:cTn>
+                                        <p:tgtEl>
+                                          <p:spTgt spid="6">
+                                            <p:txEl>
+                                              <p:pRg st="1" end="1"/>
+                                            </p:txEl>
+                                          </p:spTgt>
+                                        </p:tgtEl>
+                                        <p:attrNameLst>
+                                          <p:attrName>style.visibility</p:attrName>
+                                        </p:attrNameLst>
+                                      </p:cBhvr>
+                                      <p:to>
+                                        <p:strVal val="visible"/>
+                                      </p:to>
+                                    </p:set>
+                                  </p:childTnLst>
+                                </p:cTn>
+                              </p:par>
+                            </p:childTnLst>
+                          </p:cTn>
+                        </p:par>
+                      </p:childTnLst>
+                    </p:cTn>
+                  </p:par>
+                  <p:par>
+                    <p:cTn id="7" fill="hold">
+                      <p:stCondLst>
+                        <p:cond delay="indefinite"/>
+                      </p:stCondLst>
+                      <p:childTnLst>
+                        <p:par>
+                          <p:cTn id="8" fill="hold">
+                            <p:stCondLst>
+                              <p:cond delay="0"/>
+                            </p:stCondLst>
+                            <p:childTnLst>
+                              <p:par>
+                                <p:cTn id="9" presetID="1" presetClass="entr" presetSubtype="0" fill="hold" nodeType="clickEffect">
+                                  <p:stCondLst>
+                                    <p:cond delay="0"/>
+                                  </p:stCondLst>
+                                  <p:childTnLst>
+                                    <p:set>
+                                      <p:cBhvr>
+                                        <p:cTn id="10" dur="1" fill="hold">
+                                          <p:stCondLst>
+                                            <p:cond delay="0"/>
+                                          </p:stCondLst>
+                                        </p:cTn>
+                                        <p:tgtEl>
+                                          <p:spTgt spid="6">
+                                            <p:txEl>
+                                              <p:pRg st="2" end="2"/>
+                                            </p:txEl>
+                                          </p:spTgt>
+                                        </p:tgtEl>
+                                        <p:attrNameLst>
+                                          <p:attrName>style.visibility</p:attrName>
+                                        </p:attrNameLst>
+                                      </p:cBhvr>
+                                      <p:to>
+                                        <p:strVal val="visible"/>
+                                      </p:to>
+                                    </p:set>
+                                  </p:childTnLst>
+                                </p:cTn>
+                              </p:par>
+                            </p:childTnLst>
+                          </p:cTn>
+                        </p:par>
+                      </p:childTnLst>
+                    </p:cTn>
+                  </p:par>
+                  <p:par>
+                    <p:cTn id="11" fill="hold">
+                      <p:stCondLst>
+                        <p:cond delay="indefinite"/>
+                      </p:stCondLst>
+                      <p:childTnLst>
+                        <p:par>
+                          <p:cTn id="12" fill="hold">
+                            <p:stCondLst>
+                              <p:cond delay="0"/>
+                            </p:stCondLst>
+                            <p:childTnLst>
+                              <p:par>
+                                <p:cTn id="13" presetID="1" presetClass="entr" presetSubtype="0" fill="hold" grpId="0" nodeType="clickEffect">
+                                  <p:stCondLst>
+                                    <p:cond delay="0"/>
+                                  </p:stCondLst>
+                                  <p:childTnLst>
+                                    <p:set>
+                                      <p:cBhvr>
+                                        <p:cTn id="14" dur="1" fill="hold">
+                                          <p:stCondLst>
+                                            <p:cond delay="0"/>
+                                          </p:stCondLst>
+                                        </p:cTn>
+                                        <p:tgtEl>
+                                          <p:spTgt spid="9"/>
+                                        </p:tgtEl>
+                                        <p:attrNameLst>
+                                          <p:attrName>style.visibility</p:attrName>
+                                        </p:attrNameLst>
+                                      </p:cBhvr>
+                                      <p:to>
+                                        <p:strVal val="visible"/>
+                                      </p:to>
+                                    </p:set>
+                                  </p:childTnLst>
+                                </p:cTn>
+                              </p:par>
+                            </p:childTnLst>
+                          </p:cTn>
+                        </p:par>
+                      </p:childTnLst>
+                    </p:cTn>
+                  </p:par>
+                  <p:par>
+                    <p:cTn id="15" fill="hold">
+                      <p:stCondLst>
+                        <p:cond delay="indefinite"/>
+                      </p:stCondLst>
+                      <p:childTnLst>
+                        <p:par>
+                          <p:cTn id="16" fill="hold">
+                            <p:stCondLst>
+                              <p:cond delay="0"/>
+                            </p:stCondLst>
+                            <p:childTnLst>
+                              <p:par>
+                                <p:cTn id="17" presetID="1" presetClass="entr" presetSubtype="0" fill="hold" grpId="0" nodeType="clickEffect">
+                                  <p:stCondLst>
+                                    <p:cond delay="0"/>
+                                  </p:stCondLst>
+                                  <p:childTnLst>
+                                    <p:set>
+                                      <p:cBhvr>
+                                        <p:cTn id="18" dur="1" fill="hold">
+                                          <p:stCondLst>
+                                            <p:cond delay="0"/>
+                                          </p:stCondLst>
+                                        </p:cTn>
+                                        <p:tgtEl>
+                                          <p:spTgt spid="8"/>
+                                        </p:tgtEl>
+                                        <p:attrNameLst>
+                                          <p:attrName>style.visibility</p:attrName>
+                                        </p:attrNameLst>
+                                      </p:cBhvr>
+                                      <p:to>
+                                        <p:strVal val="visible"/>
+                                      </p:to>
+                                    </p:set>
+                                  </p:childTnLst>
+                                </p:cTn>
+                              </p:par>
+                            </p:childTnLst>
+                          </p:cTn>
+                        </p:par>
+                      </p:childTnLst>
+                    </p:cTn>
+                  </p:par>
+                </p:childTnLst>
+              </p:cTn>
+              <p:prevCondLst>
+                <p:cond evt="onPrev" delay="0">
+                  <p:tgtEl>
+                    <p:sldTgt/>
+                  </p:tgtEl>
+                </p:cond>
+              </p:prevCondLst>
+              <p:nextCondLst>
+                <p:cond evt="onNext" delay="0">
+                  <p:tgtEl>
+                    <p:sldTgt/>
+                  </p:tgtEl>
+                </p:cond>
+              </p:nextCondLst>
+            </p:seq>
+          </p:childTnLst>
+        </p:cTn>
+      </p:par>
+    </p:tnLst>
+    <p:bldLst>
+      <p:bldP spid="8" grpId="0" animBg="1"/>
+      <p:bldP spid="9" grpId="0" animBg="1"/>
+    </p:bldLst>
+  </p:timing>
+</p:sld>
+</file>
+
+<file path=ppt/slides/slide29.xml><?xml version="1.0" encoding="utf-8"?>
+<p:sld xmlns:a="http://schemas.openxmlformats.org/drawingml/2006/main" xmlns:r="http://schemas.openxmlformats.org/officeDocument/2006/relationships" xmlns:p="http://schemas.openxmlformats.org/presentationml/2006/main">
+  <p:cSld>
+    <p:spTree>
+      <p:nvGrpSpPr>
+        <p:cNvPr id="1" name=""/>
+        <p:cNvGrpSpPr/>
+        <p:nvPr/>
+      </p:nvGrpSpPr>
+      <p:grpSpPr>
+        <a:xfrm>
+          <a:off x="0" y="0"/>
+          <a:ext cx="0" cy="0"/>
+          <a:chOff x="0" y="0"/>
+          <a:chExt cx="0" cy="0"/>
+        </a:xfrm>
+      </p:grpSpPr>
+      <p:sp>
+        <p:nvSpPr>
+          <p:cNvPr id="2" name="Slide Number Placeholder 1"/>
+          <p:cNvSpPr>
+            <a:spLocks noGrp="1"/>
+          </p:cNvSpPr>
+          <p:nvPr>
+            <p:ph type="sldNum" sz="quarter" idx="5"/>
+          </p:nvPr>
+        </p:nvSpPr>
+        <p:spPr/>
+        <p:txBody>
+          <a:bodyPr/>
+          <a:lstStyle/>
+          <a:p>
+            <a:fld id="{2BF067CD-8E6B-4360-9AA8-C5DF2A48A6D1}" type="slidenum">
+              <a:rPr lang="en-US" noProof="0" smtClean="0"/>
+              <a:pPr/>
+              <a:t>29</a:t>
+            </a:fld>
+            <a:endParaRPr lang="en-US" noProof="0" dirty="0"/>
+          </a:p>
+        </p:txBody>
+      </p:sp>
+      <p:sp>
+        <p:nvSpPr>
+          <p:cNvPr id="5" name="Title 4"/>
+          <p:cNvSpPr>
+            <a:spLocks noGrp="1"/>
+          </p:cNvSpPr>
+          <p:nvPr>
+            <p:ph type="title"/>
+          </p:nvPr>
+        </p:nvSpPr>
+        <p:spPr/>
+        <p:txBody>
+          <a:bodyPr/>
+          <a:lstStyle/>
+          <a:p>
+            <a:r>
+              <a:rPr lang="bg-BG" dirty="0" smtClean="0"/>
+              <a:t>Дебъгване – видео</a:t>
+            </a:r>
+            <a:endParaRPr lang="en-US" dirty="0"/>
+          </a:p>
+        </p:txBody>
+      </p:sp>
+      <p:pic>
+        <p:nvPicPr>
+          <p:cNvPr id="7" name="Picture 6"/>
+          <p:cNvPicPr>
+            <a:picLocks noChangeAspect="1"/>
+          </p:cNvPicPr>
+          <p:nvPr/>
+        </p:nvPicPr>
+        <p:blipFill>
+          <a:blip r:embed="rId2">
+            <a:extLst>
+              <a:ext uri="{28A0092B-C50C-407E-A947-70E740481C1C}">
+                <a14:useLocalDpi xmlns:a14="http://schemas.microsoft.com/office/drawing/2010/main" val="0"/>
+              </a:ext>
+            </a:extLst>
+          </a:blip>
+          <a:stretch>
+            <a:fillRect/>
+          </a:stretch>
+        </p:blipFill>
+        <p:spPr>
+          <a:xfrm>
+            <a:off x="943500" y="1266425"/>
+            <a:ext cx="10305000" cy="5447315"/>
+          </a:xfrm>
+          <a:prstGeom prst="rect">
+            <a:avLst/>
+          </a:prstGeom>
+          <a:ln>
+            <a:solidFill>
+              <a:schemeClr val="bg2">
+                <a:lumMod val="75000"/>
+              </a:schemeClr>
+            </a:solidFill>
+          </a:ln>
+        </p:spPr>
+      </p:pic>
+    </p:spTree>
+    <p:extLst>
+      <p:ext uri="{BB962C8B-B14F-4D97-AF65-F5344CB8AC3E}">
+        <p14:creationId xmlns:p14="http://schemas.microsoft.com/office/powerpoint/2010/main" val="777550306"/>
+      </p:ext>
+    </p:extLst>
+  </p:cSld>
+  <p:clrMapOvr>
+    <a:masterClrMapping/>
+  </p:clrMapOvr>
+  <mc:AlternateContent xmlns:mc="http://schemas.openxmlformats.org/markup-compatibility/2006" xmlns:p14="http://schemas.microsoft.com/office/powerpoint/2010/main">
+    <mc:Choice Requires="p14">
+      <p:transition spd="slow" p14:dur="2000" advClick="0" advTm="5000"/>
+    </mc:Choice>
+    <mc:Fallback xmlns="">
+      <p:transition spd="slow" advClick="0" advTm="5000"/>
+    </mc:Fallback>
+  </mc:AlternateContent>
+  <p:timing>
+    <p:tnLst>
+      <p:par>
+        <p:cTn id="1" dur="indefinite" restart="never" nodeType="tmRoot"/>
+      </p:par>
+    </p:tnLst>
+  </p:timing>
+</p:sld>
+</file>
+
+<file path=ppt/slides/slide3.xml><?xml version="1.0" encoding="utf-8"?>
+<p:sld xmlns:a="http://schemas.openxmlformats.org/drawingml/2006/main" xmlns:r="http://schemas.openxmlformats.org/officeDocument/2006/relationships" xmlns:p="http://schemas.openxmlformats.org/presentationml/2006/main">
+  <p:cSld>
+    <p:spTree>
+      <p:nvGrpSpPr>
+        <p:cNvPr id="1" name=""/>
+        <p:cNvGrpSpPr/>
+        <p:nvPr/>
+      </p:nvGrpSpPr>
+      <p:grpSpPr>
+        <a:xfrm>
+          <a:off x="0" y="0"/>
+          <a:ext cx="0" cy="0"/>
+          <a:chOff x="0" y="0"/>
+          <a:chExt cx="0" cy="0"/>
+        </a:xfrm>
+      </p:grpSpPr>
+      <p:sp>
+        <p:nvSpPr>
+          <p:cNvPr id="5" name="Title 4"/>
+          <p:cNvSpPr>
+            <a:spLocks noGrp="1"/>
+          </p:cNvSpPr>
+          <p:nvPr>
+            <p:ph type="title" sz="quarter" idx="10"/>
+          </p:nvPr>
+        </p:nvSpPr>
+        <p:spPr>
+          <a:xfrm>
+            <a:off x="615109" y="5180916"/>
+            <a:ext cx="10961783" cy="768084"/>
+          </a:xfrm>
+        </p:spPr>
+        <p:txBody>
+          <a:bodyPr/>
+          <a:lstStyle/>
+          <a:p>
+            <a:r>
+              <a:rPr lang="bg-BG" dirty="0"/>
+              <a:t>͏Линеен </a:t>
+            </a:r>
+            <a:r>
+              <a:rPr lang="bg-BG" dirty="0" smtClean="0"/>
+              <a:t>алгоритъм</a:t>
+            </a:r>
+            <a:endParaRPr lang="en-US" dirty="0"/>
+          </a:p>
+        </p:txBody>
+      </p:sp>
+      <p:pic>
+        <p:nvPicPr>
+          <p:cNvPr id="7" name="Picture 6"/>
+          <p:cNvPicPr>
+            <a:picLocks noChangeAspect="1"/>
+          </p:cNvPicPr>
+          <p:nvPr/>
+        </p:nvPicPr>
+        <p:blipFill>
+          <a:blip r:embed="rId2">
+            <a:extLst>
+              <a:ext uri="{28A0092B-C50C-407E-A947-70E740481C1C}">
+                <a14:useLocalDpi xmlns:a14="http://schemas.microsoft.com/office/drawing/2010/main" val="0"/>
+              </a:ext>
+            </a:extLst>
+          </a:blip>
+          <a:stretch>
+            <a:fillRect/>
+          </a:stretch>
+        </p:blipFill>
+        <p:spPr>
+          <a:xfrm>
+            <a:off x="5302978" y="1134000"/>
+            <a:ext cx="1586044" cy="3037764"/>
+          </a:xfrm>
+          <a:prstGeom prst="rect">
+            <a:avLst/>
+          </a:prstGeom>
+        </p:spPr>
+      </p:pic>
+    </p:spTree>
+    <p:extLst>
+      <p:ext uri="{BB962C8B-B14F-4D97-AF65-F5344CB8AC3E}">
+        <p14:creationId xmlns:p14="http://schemas.microsoft.com/office/powerpoint/2010/main" val="1141257154"/>
+      </p:ext>
+    </p:extLst>
+  </p:cSld>
+  <p:clrMapOvr>
+    <a:masterClrMapping/>
+  </p:clrMapOvr>
+  <mc:AlternateContent xmlns:mc="http://schemas.openxmlformats.org/markup-compatibility/2006" xmlns:p14="http://schemas.microsoft.com/office/powerpoint/2010/main">
+    <mc:Choice Requires="p14">
+      <p:transition spd="slow" p14:dur="2000" advClick="0" advTm="5000"/>
+    </mc:Choice>
+    <mc:Fallback xmlns="">
+      <p:transition spd="slow" advClick="0" advTm="5000"/>
+    </mc:Fallback>
+  </mc:AlternateContent>
+  <p:timing>
+    <p:tnLst>
+      <p:par>
+        <p:cTn id="1" dur="indefinite" restart="never" nodeType="tmRoot"/>
+      </p:par>
+    </p:tnLst>
+  </p:timing>
+</p:sld>
+</file>
+
+<file path=ppt/slides/slide30.xml><?xml version="1.0" encoding="utf-8"?>
+<p:sld xmlns:a="http://schemas.openxmlformats.org/drawingml/2006/main" xmlns:r="http://schemas.openxmlformats.org/officeDocument/2006/relationships" xmlns:p="http://schemas.openxmlformats.org/presentationml/2006/main">
+  <p:cSld>
+    <p:spTree>
+      <p:nvGrpSpPr>
+        <p:cNvPr id="1" name=""/>
+        <p:cNvGrpSpPr/>
+        <p:nvPr/>
+      </p:nvGrpSpPr>
+      <p:grpSpPr>
+        <a:xfrm>
+          <a:off x="0" y="0"/>
+          <a:ext cx="0" cy="0"/>
+          <a:chOff x="0" y="0"/>
+          <a:chExt cx="0" cy="0"/>
+        </a:xfrm>
+      </p:grpSpPr>
+      <p:sp>
+        <p:nvSpPr>
           <p:cNvPr id="7" name="Subtitle 6"/>
           <p:cNvSpPr>
             <a:spLocks noGrp="1"/>
@@ -19590,7 +21316,7 @@
 </p:sld>
 </file>
 
-<file path=ppt/slides/slide27.xml><?xml version="1.0" encoding="utf-8"?>
+<file path=ppt/slides/slide31.xml><?xml version="1.0" encoding="utf-8"?>
 <p:sld xmlns:a="http://schemas.openxmlformats.org/drawingml/2006/main" xmlns:r="http://schemas.openxmlformats.org/officeDocument/2006/relationships" xmlns:p="http://schemas.openxmlformats.org/presentationml/2006/main">
   <p:cSld>
     <p:spTree>
@@ -19948,7 +21674,7 @@
             <a:fld id="{2BF067CD-8E6B-4360-9AA8-C5DF2A48A6D1}" type="slidenum">
               <a:rPr lang="en-US" smtClean="0"/>
               <a:pPr/>
-              <a:t>27</a:t>
+              <a:t>31</a:t>
             </a:fld>
             <a:endParaRPr lang="en-US" dirty="0"/>
           </a:p>
@@ -20386,7 +22112,7 @@
 </p:sld>
 </file>
 
-<file path=ppt/slides/slide28.xml><?xml version="1.0" encoding="utf-8"?>
+<file path=ppt/slides/slide32.xml><?xml version="1.0" encoding="utf-8"?>
 <p:sld xmlns:a="http://schemas.openxmlformats.org/drawingml/2006/main" xmlns:r="http://schemas.openxmlformats.org/officeDocument/2006/relationships" xmlns:p="http://schemas.openxmlformats.org/presentationml/2006/main">
   <p:cSld>
     <p:spTree>
@@ -20944,7 +22670,7 @@
             <a:fld id="{2BF067CD-8E6B-4360-9AA8-C5DF2A48A6D1}" type="slidenum">
               <a:rPr lang="en-US" smtClean="0"/>
               <a:pPr/>
-              <a:t>28</a:t>
+              <a:t>32</a:t>
             </a:fld>
             <a:endParaRPr lang="en-US" dirty="0"/>
           </a:p>
@@ -21094,7 +22820,7 @@
 </p:sld>
 </file>
 
-<file path=ppt/slides/slide29.xml><?xml version="1.0" encoding="utf-8"?>
+<file path=ppt/slides/slide33.xml><?xml version="1.0" encoding="utf-8"?>
 <p:sld xmlns:a="http://schemas.openxmlformats.org/drawingml/2006/main" xmlns:r="http://schemas.openxmlformats.org/officeDocument/2006/relationships" xmlns:p="http://schemas.openxmlformats.org/presentationml/2006/main">
   <p:cSld>
     <p:spTree>
@@ -21232,114 +22958,7 @@
 </p:sld>
 </file>
 
-<file path=ppt/slides/slide3.xml><?xml version="1.0" encoding="utf-8"?>
-<p:sld xmlns:a="http://schemas.openxmlformats.org/drawingml/2006/main" xmlns:r="http://schemas.openxmlformats.org/officeDocument/2006/relationships" xmlns:p="http://schemas.openxmlformats.org/presentationml/2006/main">
-  <p:cSld>
-    <p:spTree>
-      <p:nvGrpSpPr>
-        <p:cNvPr id="1" name=""/>
-        <p:cNvGrpSpPr/>
-        <p:nvPr/>
-      </p:nvGrpSpPr>
-      <p:grpSpPr>
-        <a:xfrm>
-          <a:off x="0" y="0"/>
-          <a:ext cx="0" cy="0"/>
-          <a:chOff x="0" y="0"/>
-          <a:chExt cx="0" cy="0"/>
-        </a:xfrm>
-      </p:grpSpPr>
-      <p:sp>
-        <p:nvSpPr>
-          <p:cNvPr id="5" name="Title 4"/>
-          <p:cNvSpPr>
-            <a:spLocks noGrp="1"/>
-          </p:cNvSpPr>
-          <p:nvPr>
-            <p:ph type="title" sz="quarter" idx="10"/>
-          </p:nvPr>
-        </p:nvSpPr>
-        <p:spPr>
-          <a:xfrm>
-            <a:off x="615109" y="5180916"/>
-            <a:ext cx="10961783" cy="768084"/>
-          </a:xfrm>
-        </p:spPr>
-        <p:txBody>
-          <a:bodyPr/>
-          <a:lstStyle/>
-          <a:p>
-            <a:r>
-              <a:rPr lang="bg-BG" dirty="0"/>
-              <a:t>͏Линеен </a:t>
-            </a:r>
-            <a:r>
-              <a:rPr lang="bg-BG" dirty="0" smtClean="0"/>
-              <a:t>алгоритъм</a:t>
-            </a:r>
-            <a:endParaRPr lang="en-US" dirty="0"/>
-          </a:p>
-        </p:txBody>
-      </p:sp>
-      <p:pic>
-        <p:nvPicPr>
-          <p:cNvPr id="7" name="Picture 6"/>
-          <p:cNvPicPr>
-            <a:picLocks noChangeAspect="1"/>
-          </p:cNvPicPr>
-          <p:nvPr/>
-        </p:nvPicPr>
-        <p:blipFill>
-          <a:blip r:embed="rId2">
-            <a:extLst>
-              <a:ext uri="{28A0092B-C50C-407E-A947-70E740481C1C}">
-                <a14:useLocalDpi xmlns:a14="http://schemas.microsoft.com/office/drawing/2010/main" val="0"/>
-              </a:ext>
-            </a:extLst>
-          </a:blip>
-          <a:stretch>
-            <a:fillRect/>
-          </a:stretch>
-        </p:blipFill>
-        <p:spPr>
-          <a:xfrm>
-            <a:off x="5302978" y="1134000"/>
-            <a:ext cx="1586044" cy="3037764"/>
-          </a:xfrm>
-          <a:prstGeom prst="rect">
-            <a:avLst/>
-          </a:prstGeom>
-        </p:spPr>
-      </p:pic>
-    </p:spTree>
-    <p:extLst>
-      <p:ext uri="{BB962C8B-B14F-4D97-AF65-F5344CB8AC3E}">
-        <p14:creationId xmlns:p14="http://schemas.microsoft.com/office/powerpoint/2010/main" val="1141257154"/>
-      </p:ext>
-    </p:extLst>
-  </p:cSld>
-  <p:clrMapOvr>
-    <a:masterClrMapping/>
-  </p:clrMapOvr>
-  <mc:AlternateContent xmlns:mc="http://schemas.openxmlformats.org/markup-compatibility/2006" xmlns:p14="http://schemas.microsoft.com/office/powerpoint/2010/main">
-    <mc:Choice Requires="p14">
-      <p:transition spd="slow" p14:dur="2000" advClick="0" advTm="5000"/>
-    </mc:Choice>
-    <mc:Fallback xmlns="">
-      <p:transition spd="slow" advClick="0" advTm="5000"/>
-    </mc:Fallback>
-  </mc:AlternateContent>
-  <p:timing>
-    <p:tnLst>
-      <p:par>
-        <p:cTn id="1" dur="indefinite" restart="never" nodeType="tmRoot"/>
-      </p:par>
-    </p:tnLst>
-  </p:timing>
-</p:sld>
-</file>
-
-<file path=ppt/slides/slide30.xml><?xml version="1.0" encoding="utf-8"?>
+<file path=ppt/slides/slide34.xml><?xml version="1.0" encoding="utf-8"?>
 <p:sld xmlns:a="http://schemas.openxmlformats.org/drawingml/2006/main" xmlns:r="http://schemas.openxmlformats.org/officeDocument/2006/relationships" xmlns:p="http://schemas.openxmlformats.org/presentationml/2006/main">
   <p:cSld>
     <p:spTree>
@@ -21873,7 +23492,7 @@
             <a:fld id="{2BF067CD-8E6B-4360-9AA8-C5DF2A48A6D1}" type="slidenum">
               <a:rPr lang="en-US" smtClean="0"/>
               <a:pPr/>
-              <a:t>30</a:t>
+              <a:t>34</a:t>
             </a:fld>
             <a:endParaRPr lang="en-US" dirty="0"/>
           </a:p>
@@ -21978,7 +23597,7 @@
 </p:sld>
 </file>
 
-<file path=ppt/slides/slide31.xml><?xml version="1.0" encoding="utf-8"?>
+<file path=ppt/slides/slide35.xml><?xml version="1.0" encoding="utf-8"?>
 <p:sld xmlns:a="http://schemas.openxmlformats.org/drawingml/2006/main" xmlns:r="http://schemas.openxmlformats.org/officeDocument/2006/relationships" xmlns:p="http://schemas.openxmlformats.org/presentationml/2006/main">
   <p:cSld>
     <p:spTree>
@@ -22505,7 +24124,7 @@
             <a:fld id="{2BF067CD-8E6B-4360-9AA8-C5DF2A48A6D1}" type="slidenum">
               <a:rPr lang="en-US" smtClean="0"/>
               <a:pPr/>
-              <a:t>31</a:t>
+              <a:t>35</a:t>
             </a:fld>
             <a:endParaRPr lang="en-US" dirty="0"/>
           </a:p>
@@ -22610,7 +24229,7 @@
 </p:sld>
 </file>
 
-<file path=ppt/slides/slide32.xml><?xml version="1.0" encoding="utf-8"?>
+<file path=ppt/slides/slide36.xml><?xml version="1.0" encoding="utf-8"?>
 <p:sld xmlns:a="http://schemas.openxmlformats.org/drawingml/2006/main" xmlns:r="http://schemas.openxmlformats.org/officeDocument/2006/relationships" xmlns:p="http://schemas.openxmlformats.org/presentationml/2006/main">
   <p:cSld>
     <p:spTree>
@@ -22872,7 +24491,7 @@
             <a:fld id="{C014DD1E-5D91-48A3-AD6D-45FBA980D106}" type="slidenum">
               <a:rPr lang="en-US" smtClean="0"/>
               <a:pPr/>
-              <a:t>32</a:t>
+              <a:t>36</a:t>
             </a:fld>
             <a:endParaRPr lang="en-US" dirty="0"/>
           </a:p>
@@ -23419,6 +25038,28 @@
               </a:rPr>
               <a:t>проверки</a:t>
             </a:r>
+            <a:endParaRPr lang="en-US" sz="3200" dirty="0" smtClean="0">
+              <a:solidFill>
+                <a:schemeClr val="bg2"/>
+              </a:solidFill>
+              <a:latin typeface="Calibri (Body)"/>
+            </a:endParaRPr>
+          </a:p>
+          <a:p>
+            <a:r>
+              <a:rPr lang="bg-BG" sz="3200" dirty="0">
+                <a:solidFill>
+                  <a:schemeClr val="bg2"/>
+                </a:solidFill>
+              </a:rPr>
+              <a:t>Дебъгване</a:t>
+            </a:r>
+            <a:endParaRPr lang="bg-BG" sz="3200" dirty="0" smtClean="0">
+              <a:solidFill>
+                <a:schemeClr val="bg2"/>
+              </a:solidFill>
+              <a:latin typeface="Calibri (Body)"/>
+            </a:endParaRPr>
           </a:p>
           <a:p>
             <a:r>
@@ -23683,6 +25324,55 @@
                       </p:childTnLst>
                     </p:cTn>
                   </p:par>
+                  <p:par>
+                    <p:cTn id="19" fill="hold">
+                      <p:stCondLst>
+                        <p:cond delay="indefinite"/>
+                      </p:stCondLst>
+                      <p:childTnLst>
+                        <p:par>
+                          <p:cTn id="20" fill="hold">
+                            <p:stCondLst>
+                              <p:cond delay="0"/>
+                            </p:stCondLst>
+                            <p:childTnLst>
+                              <p:par>
+                                <p:cTn id="21" presetID="1" presetClass="entr" presetSubtype="0" fill="hold" nodeType="clickEffect">
+                                  <p:stCondLst>
+                                    <p:cond delay="0"/>
+                                  </p:stCondLst>
+                                  <p:childTnLst>
+                                    <p:set>
+                                      <p:cBhvr>
+                                        <p:cTn id="22" dur="1" fill="hold">
+                                          <p:stCondLst>
+                                            <p:cond delay="0"/>
+                                          </p:stCondLst>
+                                        </p:cTn>
+                                        <p:tgtEl>
+                                          <p:spTgt spid="15">
+                                            <p:txEl>
+                                              <p:pRg st="5" end="5"/>
+                                            </p:txEl>
+                                          </p:spTgt>
+                                        </p:tgtEl>
+                                        <p:attrNameLst>
+                                          <p:attrName>style.visibility</p:attrName>
+                                        </p:attrNameLst>
+                                      </p:cBhvr>
+                                      <p:to>
+                                        <p:strVal val="visible"/>
+                                      </p:to>
+                                    </p:set>
+                                  </p:childTnLst>
+                                </p:cTn>
+                              </p:par>
+                            </p:childTnLst>
+                          </p:cTn>
+                        </p:par>
+                      </p:childTnLst>
+                    </p:cTn>
+                  </p:par>
                 </p:childTnLst>
               </p:cTn>
               <p:prevCondLst>
@@ -23708,7 +25398,7 @@
 </p:sld>
 </file>
 
-<file path=ppt/slides/slide33.xml><?xml version="1.0" encoding="utf-8"?>
+<file path=ppt/slides/slide37.xml><?xml version="1.0" encoding="utf-8"?>
 <p:sld xmlns:a="http://schemas.openxmlformats.org/drawingml/2006/main" xmlns:r="http://schemas.openxmlformats.org/officeDocument/2006/relationships" xmlns:p="http://schemas.openxmlformats.org/presentationml/2006/main">
   <p:cSld>
     <p:spTree>
@@ -23822,7 +25512,7 @@
                 <a:hlinkClick r:id="rId3">
                   <a:extLst>
                     <a:ext uri="{A12FA001-AC4F-418D-AE19-62706E023703}">
-                      <ahyp:hlinkClr xmlns="" xmlns:ahyp="http://schemas.microsoft.com/office/drawing/2018/hyperlinkcolor" val="tx"/>
+                      <ahyp:hlinkClr xmlns:ahyp="http://schemas.microsoft.com/office/drawing/2018/hyperlinkcolor" xmlns="" val="tx"/>
                     </a:ext>
                   </a:extLst>
                 </a:hlinkClick>
@@ -23905,7 +25595,7 @@
 </p:sld>
 </file>
 
-<file path=ppt/slides/slide34.xml><?xml version="1.0" encoding="utf-8"?>
+<file path=ppt/slides/slide38.xml><?xml version="1.0" encoding="utf-8"?>
 <p:sld xmlns:a="http://schemas.openxmlformats.org/drawingml/2006/main" xmlns:r="http://schemas.openxmlformats.org/officeDocument/2006/relationships" xmlns:p="http://schemas.openxmlformats.org/presentationml/2006/main" show="0">
   <p:cSld>
     <p:spTree>
@@ -23958,7 +25648,7 @@
             <a:fld id="{2BF067CD-8E6B-4360-9AA8-C5DF2A48A6D1}" type="slidenum">
               <a:rPr lang="en-US" smtClean="0"/>
               <a:pPr/>
-              <a:t>34</a:t>
+              <a:t>38</a:t>
             </a:fld>
             <a:endParaRPr lang="en-US" dirty="0"/>
           </a:p>

</xml_diff>